<commit_message>
Capítulo 9: Biblioteca utilitária impacta-utils.jar e exercício final do capítulo.
</commit_message>
<xml_diff>
--- a/2-Java-Programmer-Modulo-II/15.Capitulo09.pptx
+++ b/2-Java-Programmer-Modulo-II/15.Capitulo09.pptx
@@ -5,7 +5,7 @@
     <p:sldMasterId id="2147483660" r:id="rId1"/>
   </p:sldMasterIdLst>
   <p:notesMasterIdLst>
-    <p:notesMasterId r:id="rId13"/>
+    <p:notesMasterId r:id="rId15"/>
   </p:notesMasterIdLst>
   <p:sldIdLst>
     <p:sldId id="256" r:id="rId2"/>
@@ -19,6 +19,8 @@
     <p:sldId id="302" r:id="rId10"/>
     <p:sldId id="307" r:id="rId11"/>
     <p:sldId id="304" r:id="rId12"/>
+    <p:sldId id="310" r:id="rId13"/>
+    <p:sldId id="311" r:id="rId14"/>
   </p:sldIdLst>
   <p:sldSz cx="9144000" cy="6858000" type="screen4x3"/>
   <p:notesSz cx="6858000" cy="9144000"/>
@@ -259,7 +261,7 @@
               <a:pPr>
                 <a:defRPr/>
               </a:pPr>
-              <a:t>29/04/2012</a:t>
+              <a:t>30/04/2012</a:t>
             </a:fld>
             <a:endParaRPr lang="pt-BR"/>
           </a:p>
@@ -897,6 +899,180 @@
 </p:notes>
 </file>
 
+<file path=ppt/notesSlides/notesSlide12.xml><?xml version="1.0" encoding="utf-8"?>
+<p:notes xmlns:a="http://schemas.openxmlformats.org/drawingml/2006/main" xmlns:r="http://schemas.openxmlformats.org/officeDocument/2006/relationships" xmlns:p="http://schemas.openxmlformats.org/presentationml/2006/main">
+  <p:cSld>
+    <p:spTree>
+      <p:nvGrpSpPr>
+        <p:cNvPr id="1" name=""/>
+        <p:cNvGrpSpPr/>
+        <p:nvPr/>
+      </p:nvGrpSpPr>
+      <p:grpSpPr>
+        <a:xfrm>
+          <a:off x="0" y="0"/>
+          <a:ext cx="0" cy="0"/>
+          <a:chOff x="0" y="0"/>
+          <a:chExt cx="0" cy="0"/>
+        </a:xfrm>
+      </p:grpSpPr>
+      <p:sp>
+        <p:nvSpPr>
+          <p:cNvPr id="2" name="Espaço Reservado para Imagem de Slide 1"/>
+          <p:cNvSpPr>
+            <a:spLocks noGrp="1" noRot="1" noChangeAspect="1"/>
+          </p:cNvSpPr>
+          <p:nvPr>
+            <p:ph type="sldImg"/>
+          </p:nvPr>
+        </p:nvSpPr>
+        <p:spPr/>
+      </p:sp>
+      <p:sp>
+        <p:nvSpPr>
+          <p:cNvPr id="3" name="Espaço Reservado para Anotações 2"/>
+          <p:cNvSpPr>
+            <a:spLocks noGrp="1"/>
+          </p:cNvSpPr>
+          <p:nvPr>
+            <p:ph type="body" idx="1"/>
+          </p:nvPr>
+        </p:nvSpPr>
+        <p:spPr/>
+        <p:txBody>
+          <a:bodyPr>
+            <a:normAutofit/>
+          </a:bodyPr>
+          <a:lstStyle/>
+          <a:p>
+            <a:endParaRPr lang="pt-BR"/>
+          </a:p>
+        </p:txBody>
+      </p:sp>
+      <p:sp>
+        <p:nvSpPr>
+          <p:cNvPr id="4" name="Espaço Reservado para Número de Slide 3"/>
+          <p:cNvSpPr>
+            <a:spLocks noGrp="1"/>
+          </p:cNvSpPr>
+          <p:nvPr>
+            <p:ph type="sldNum" sz="quarter" idx="10"/>
+          </p:nvPr>
+        </p:nvSpPr>
+        <p:spPr/>
+        <p:txBody>
+          <a:bodyPr/>
+          <a:lstStyle/>
+          <a:p>
+            <a:pPr>
+              <a:defRPr/>
+            </a:pPr>
+            <a:fld id="{5E3236A0-041D-4BA8-9C4A-2A0B15F4BA5B}" type="slidenum">
+              <a:rPr lang="pt-BR" smtClean="0"/>
+              <a:pPr>
+                <a:defRPr/>
+              </a:pPr>
+              <a:t>12</a:t>
+            </a:fld>
+            <a:endParaRPr lang="pt-BR"/>
+          </a:p>
+        </p:txBody>
+      </p:sp>
+    </p:spTree>
+  </p:cSld>
+  <p:clrMapOvr>
+    <a:masterClrMapping/>
+  </p:clrMapOvr>
+</p:notes>
+</file>
+
+<file path=ppt/notesSlides/notesSlide13.xml><?xml version="1.0" encoding="utf-8"?>
+<p:notes xmlns:a="http://schemas.openxmlformats.org/drawingml/2006/main" xmlns:r="http://schemas.openxmlformats.org/officeDocument/2006/relationships" xmlns:p="http://schemas.openxmlformats.org/presentationml/2006/main">
+  <p:cSld>
+    <p:spTree>
+      <p:nvGrpSpPr>
+        <p:cNvPr id="1" name=""/>
+        <p:cNvGrpSpPr/>
+        <p:nvPr/>
+      </p:nvGrpSpPr>
+      <p:grpSpPr>
+        <a:xfrm>
+          <a:off x="0" y="0"/>
+          <a:ext cx="0" cy="0"/>
+          <a:chOff x="0" y="0"/>
+          <a:chExt cx="0" cy="0"/>
+        </a:xfrm>
+      </p:grpSpPr>
+      <p:sp>
+        <p:nvSpPr>
+          <p:cNvPr id="2" name="Espaço Reservado para Imagem de Slide 1"/>
+          <p:cNvSpPr>
+            <a:spLocks noGrp="1" noRot="1" noChangeAspect="1"/>
+          </p:cNvSpPr>
+          <p:nvPr>
+            <p:ph type="sldImg"/>
+          </p:nvPr>
+        </p:nvSpPr>
+        <p:spPr/>
+      </p:sp>
+      <p:sp>
+        <p:nvSpPr>
+          <p:cNvPr id="3" name="Espaço Reservado para Anotações 2"/>
+          <p:cNvSpPr>
+            <a:spLocks noGrp="1"/>
+          </p:cNvSpPr>
+          <p:nvPr>
+            <p:ph type="body" idx="1"/>
+          </p:nvPr>
+        </p:nvSpPr>
+        <p:spPr/>
+        <p:txBody>
+          <a:bodyPr>
+            <a:normAutofit/>
+          </a:bodyPr>
+          <a:lstStyle/>
+          <a:p>
+            <a:endParaRPr lang="pt-BR"/>
+          </a:p>
+        </p:txBody>
+      </p:sp>
+      <p:sp>
+        <p:nvSpPr>
+          <p:cNvPr id="4" name="Espaço Reservado para Número de Slide 3"/>
+          <p:cNvSpPr>
+            <a:spLocks noGrp="1"/>
+          </p:cNvSpPr>
+          <p:nvPr>
+            <p:ph type="sldNum" sz="quarter" idx="10"/>
+          </p:nvPr>
+        </p:nvSpPr>
+        <p:spPr/>
+        <p:txBody>
+          <a:bodyPr/>
+          <a:lstStyle/>
+          <a:p>
+            <a:pPr>
+              <a:defRPr/>
+            </a:pPr>
+            <a:fld id="{5E3236A0-041D-4BA8-9C4A-2A0B15F4BA5B}" type="slidenum">
+              <a:rPr lang="pt-BR" smtClean="0"/>
+              <a:pPr>
+                <a:defRPr/>
+              </a:pPr>
+              <a:t>13</a:t>
+            </a:fld>
+            <a:endParaRPr lang="pt-BR"/>
+          </a:p>
+        </p:txBody>
+      </p:sp>
+    </p:spTree>
+  </p:cSld>
+  <p:clrMapOvr>
+    <a:masterClrMapping/>
+  </p:clrMapOvr>
+</p:notes>
+</file>
+
 <file path=ppt/notesSlides/notesSlide2.xml><?xml version="1.0" encoding="utf-8"?>
 <p:notes xmlns:a="http://schemas.openxmlformats.org/drawingml/2006/main" xmlns:r="http://schemas.openxmlformats.org/officeDocument/2006/relationships" xmlns:p="http://schemas.openxmlformats.org/presentationml/2006/main">
   <p:cSld>
@@ -2081,7 +2257,7 @@
               <a:pPr>
                 <a:defRPr/>
               </a:pPr>
-              <a:t>29/04/2012</a:t>
+              <a:t>30/04/2012</a:t>
             </a:fld>
             <a:endParaRPr lang="pt-BR"/>
           </a:p>
@@ -2273,7 +2449,7 @@
               <a:pPr>
                 <a:defRPr/>
               </a:pPr>
-              <a:t>29/04/2012</a:t>
+              <a:t>30/04/2012</a:t>
             </a:fld>
             <a:endParaRPr lang="pt-BR"/>
           </a:p>
@@ -2475,7 +2651,7 @@
               <a:pPr>
                 <a:defRPr/>
               </a:pPr>
-              <a:t>29/04/2012</a:t>
+              <a:t>30/04/2012</a:t>
             </a:fld>
             <a:endParaRPr lang="pt-BR"/>
           </a:p>
@@ -2671,7 +2847,7 @@
               <a:pPr>
                 <a:defRPr/>
               </a:pPr>
-              <a:t>29/04/2012</a:t>
+              <a:t>30/04/2012</a:t>
             </a:fld>
             <a:endParaRPr lang="pt-BR"/>
           </a:p>
@@ -3177,7 +3353,7 @@
               <a:pPr>
                 <a:defRPr/>
               </a:pPr>
-              <a:t>29/04/2012</a:t>
+              <a:t>30/04/2012</a:t>
             </a:fld>
             <a:endParaRPr lang="pt-BR"/>
           </a:p>
@@ -3468,7 +3644,7 @@
               <a:pPr>
                 <a:defRPr/>
               </a:pPr>
-              <a:t>29/04/2012</a:t>
+              <a:t>30/04/2012</a:t>
             </a:fld>
             <a:endParaRPr lang="pt-BR"/>
           </a:p>
@@ -3869,7 +4045,7 @@
               <a:pPr>
                 <a:defRPr/>
               </a:pPr>
-              <a:t>29/04/2012</a:t>
+              <a:t>30/04/2012</a:t>
             </a:fld>
             <a:endParaRPr lang="pt-BR"/>
           </a:p>
@@ -4018,7 +4194,7 @@
               <a:pPr>
                 <a:defRPr/>
               </a:pPr>
-              <a:t>29/04/2012</a:t>
+              <a:t>30/04/2012</a:t>
             </a:fld>
             <a:endParaRPr lang="pt-BR"/>
           </a:p>
@@ -4135,7 +4311,7 @@
               <a:pPr>
                 <a:defRPr/>
               </a:pPr>
-              <a:t>29/04/2012</a:t>
+              <a:t>30/04/2012</a:t>
             </a:fld>
             <a:endParaRPr lang="pt-BR"/>
           </a:p>
@@ -4411,7 +4587,7 @@
               <a:pPr>
                 <a:defRPr/>
               </a:pPr>
-              <a:t>29/04/2012</a:t>
+              <a:t>30/04/2012</a:t>
             </a:fld>
             <a:endParaRPr lang="pt-BR"/>
           </a:p>
@@ -4695,7 +4871,7 @@
               <a:pPr>
                 <a:defRPr/>
               </a:pPr>
-              <a:t>29/04/2012</a:t>
+              <a:t>30/04/2012</a:t>
             </a:fld>
             <a:endParaRPr lang="pt-BR"/>
           </a:p>
@@ -5173,7 +5349,7 @@
               <a:pPr>
                 <a:defRPr/>
               </a:pPr>
-              <a:t>29/04/2012</a:t>
+              <a:t>30/04/2012</a:t>
             </a:fld>
             <a:endParaRPr lang="pt-BR"/>
           </a:p>
@@ -5903,11 +6079,7 @@
           <a:p>
             <a:r>
               <a:rPr lang="pt-BR" sz="2400" dirty="0" smtClean="0"/>
-              <a:t>Muitos destes arquivos tratam-se de bibliotecas utilitárias que são </a:t>
-            </a:r>
-            <a:r>
-              <a:rPr lang="pt-BR" sz="2400" dirty="0" smtClean="0"/>
-              <a:t>distribuídas de forma </a:t>
+              <a:t>Muitos destes arquivos tratam-se de bibliotecas utilitárias que são distribuídas de forma </a:t>
             </a:r>
             <a:r>
               <a:rPr lang="pt-BR" sz="2400" i="1" dirty="0" smtClean="0"/>
@@ -5915,11 +6087,7 @@
             </a:r>
             <a:r>
               <a:rPr lang="pt-BR" sz="2400" dirty="0" smtClean="0"/>
-              <a:t> na </a:t>
-            </a:r>
-            <a:r>
-              <a:rPr lang="pt-BR" sz="2400" dirty="0" smtClean="0"/>
-              <a:t>Internet.</a:t>
+              <a:t> na Internet.</a:t>
             </a:r>
             <a:endParaRPr lang="pt-BR" sz="2400" dirty="0"/>
           </a:p>
@@ -6044,7 +6212,12 @@
             <p:ph idx="1"/>
           </p:nvPr>
         </p:nvSpPr>
-        <p:spPr/>
+        <p:spPr>
+          <a:xfrm>
+            <a:off x="457200" y="1600200"/>
+            <a:ext cx="8219256" cy="4525963"/>
+          </a:xfrm>
+        </p:spPr>
         <p:txBody>
           <a:bodyPr/>
           <a:lstStyle/>
@@ -6092,17 +6265,226 @@
             <a:endParaRPr lang="pt-BR" sz="2400" dirty="0" smtClean="0"/>
           </a:p>
           <a:p>
-            <a:r>
-              <a:rPr lang="pt-BR" sz="2400" dirty="0" smtClean="0"/>
-              <a:t>X</a:t>
-            </a:r>
-          </a:p>
-          <a:p>
+            <a:pPr marL="0" indent="0">
+              <a:buNone/>
+            </a:pPr>
+            <a:endParaRPr lang="pt-BR" sz="2400" dirty="0" smtClean="0"/>
+          </a:p>
+          <a:p>
+            <a:pPr marL="1341438" indent="-898525">
+              <a:buNone/>
+            </a:pPr>
+            <a:r>
+              <a:rPr lang="pt-BR" sz="2400" dirty="0" err="1" smtClean="0">
+                <a:solidFill>
+                  <a:srgbClr val="FFC000"/>
+                </a:solidFill>
+              </a:rPr>
+              <a:t>javac</a:t>
+            </a:r>
+            <a:r>
+              <a:rPr lang="pt-BR" sz="2400" dirty="0" smtClean="0">
+                <a:solidFill>
+                  <a:srgbClr val="FFC000"/>
+                </a:solidFill>
+              </a:rPr>
+              <a:t>	-</a:t>
+            </a:r>
+            <a:r>
+              <a:rPr lang="pt-BR" sz="2400" dirty="0" err="1" smtClean="0">
+                <a:solidFill>
+                  <a:srgbClr val="FFC000"/>
+                </a:solidFill>
+              </a:rPr>
+              <a:t>cp</a:t>
+            </a:r>
+            <a:r>
+              <a:rPr lang="pt-BR" sz="2400" dirty="0" smtClean="0">
+                <a:solidFill>
+                  <a:srgbClr val="FFC000"/>
+                </a:solidFill>
+              </a:rPr>
+              <a:t>  </a:t>
+            </a:r>
+            <a:r>
+              <a:rPr lang="pt-BR" sz="2400" u="sng" dirty="0" smtClean="0">
+                <a:solidFill>
+                  <a:srgbClr val="FFC000"/>
+                </a:solidFill>
+              </a:rPr>
+              <a:t>C:\lib1.jar</a:t>
+            </a:r>
+            <a:r>
+              <a:rPr lang="pt-BR" sz="2400" dirty="0" smtClean="0">
+                <a:solidFill>
+                  <a:srgbClr val="FFC000"/>
+                </a:solidFill>
+              </a:rPr>
+              <a:t>;</a:t>
+            </a:r>
+            <a:r>
+              <a:rPr lang="pt-BR" sz="2400" u="sng" dirty="0" smtClean="0">
+                <a:solidFill>
+                  <a:srgbClr val="FFC000"/>
+                </a:solidFill>
+              </a:rPr>
+              <a:t>C:\lib2.jar</a:t>
+            </a:r>
+            <a:r>
+              <a:rPr lang="pt-BR" sz="2400" dirty="0" smtClean="0">
+                <a:solidFill>
+                  <a:srgbClr val="FFC000"/>
+                </a:solidFill>
+              </a:rPr>
+              <a:t>;...;</a:t>
+            </a:r>
+            <a:r>
+              <a:rPr lang="pt-BR" sz="2400" u="sng" dirty="0" smtClean="0">
+                <a:solidFill>
+                  <a:srgbClr val="FFC000"/>
+                </a:solidFill>
+              </a:rPr>
+              <a:t>D:\libX.jar</a:t>
+            </a:r>
+            <a:r>
+              <a:rPr lang="pt-BR" sz="2400" dirty="0" smtClean="0">
+                <a:solidFill>
+                  <a:srgbClr val="FFC000"/>
+                </a:solidFill>
+              </a:rPr>
+              <a:t>  C:\projeto5\br\com\teste\OlaMundo.java</a:t>
+            </a:r>
             <a:endParaRPr lang="pt-BR" sz="2400" b="1" dirty="0" smtClean="0">
               <a:solidFill>
                 <a:srgbClr val="FFC000"/>
               </a:solidFill>
             </a:endParaRPr>
+          </a:p>
+          <a:p>
+            <a:pPr marL="0" indent="0">
+              <a:buNone/>
+            </a:pPr>
+            <a:endParaRPr lang="pt-BR" sz="2400" dirty="0" smtClean="0"/>
+          </a:p>
+          <a:p>
+            <a:pPr marL="1341438" indent="-898525">
+              <a:buNone/>
+            </a:pPr>
+            <a:r>
+              <a:rPr lang="pt-BR" sz="2400" dirty="0" err="1" smtClean="0">
+                <a:solidFill>
+                  <a:srgbClr val="FFC000"/>
+                </a:solidFill>
+              </a:rPr>
+              <a:t>java</a:t>
+            </a:r>
+            <a:r>
+              <a:rPr lang="pt-BR" sz="2400" dirty="0" smtClean="0">
+                <a:solidFill>
+                  <a:srgbClr val="FFC000"/>
+                </a:solidFill>
+              </a:rPr>
+              <a:t>	-</a:t>
+            </a:r>
+            <a:r>
+              <a:rPr lang="pt-BR" sz="2400" dirty="0" err="1" smtClean="0">
+                <a:solidFill>
+                  <a:srgbClr val="FFC000"/>
+                </a:solidFill>
+              </a:rPr>
+              <a:t>cp</a:t>
+            </a:r>
+            <a:r>
+              <a:rPr lang="pt-BR" sz="2400" dirty="0" smtClean="0">
+                <a:solidFill>
+                  <a:srgbClr val="FFC000"/>
+                </a:solidFill>
+              </a:rPr>
+              <a:t>  </a:t>
+            </a:r>
+            <a:r>
+              <a:rPr lang="pt-BR" sz="2400" u="sng" dirty="0" smtClean="0">
+                <a:solidFill>
+                  <a:srgbClr val="FFC000"/>
+                </a:solidFill>
+              </a:rPr>
+              <a:t>C:\lib1.jar</a:t>
+            </a:r>
+            <a:r>
+              <a:rPr lang="pt-BR" sz="2400" dirty="0" smtClean="0">
+                <a:solidFill>
+                  <a:srgbClr val="FFC000"/>
+                </a:solidFill>
+              </a:rPr>
+              <a:t>;</a:t>
+            </a:r>
+            <a:r>
+              <a:rPr lang="pt-BR" sz="2400" u="sng" dirty="0" smtClean="0">
+                <a:solidFill>
+                  <a:srgbClr val="FFC000"/>
+                </a:solidFill>
+              </a:rPr>
+              <a:t>C:\lib2.jar</a:t>
+            </a:r>
+            <a:r>
+              <a:rPr lang="pt-BR" sz="2400" dirty="0" smtClean="0">
+                <a:solidFill>
+                  <a:srgbClr val="FFC000"/>
+                </a:solidFill>
+              </a:rPr>
+              <a:t>;...;</a:t>
+            </a:r>
+            <a:r>
+              <a:rPr lang="pt-BR" sz="2400" u="sng" dirty="0" smtClean="0">
+                <a:solidFill>
+                  <a:srgbClr val="FFC000"/>
+                </a:solidFill>
+              </a:rPr>
+              <a:t>D:\libX.jar</a:t>
+            </a:r>
+            <a:r>
+              <a:rPr lang="pt-BR" sz="2400" dirty="0" smtClean="0">
+                <a:solidFill>
+                  <a:srgbClr val="FFC000"/>
+                </a:solidFill>
+              </a:rPr>
+              <a:t>;</a:t>
+            </a:r>
+            <a:r>
+              <a:rPr lang="pt-BR" sz="2400" u="sng" dirty="0" smtClean="0">
+                <a:solidFill>
+                  <a:srgbClr val="FFC000"/>
+                </a:solidFill>
+              </a:rPr>
+              <a:t>C:\projeto5</a:t>
+            </a:r>
+            <a:r>
+              <a:rPr lang="pt-BR" sz="2400" dirty="0" smtClean="0">
+                <a:solidFill>
+                  <a:srgbClr val="FFC000"/>
+                </a:solidFill>
+              </a:rPr>
+              <a:t> br.com.teste.</a:t>
+            </a:r>
+            <a:r>
+              <a:rPr lang="pt-BR" sz="2400" dirty="0" err="1" smtClean="0">
+                <a:solidFill>
+                  <a:srgbClr val="FFC000"/>
+                </a:solidFill>
+              </a:rPr>
+              <a:t>OlaMundo</a:t>
+            </a:r>
+            <a:endParaRPr lang="pt-BR" sz="2400" b="1" dirty="0" smtClean="0">
+              <a:solidFill>
+                <a:srgbClr val="FFC000"/>
+              </a:solidFill>
+            </a:endParaRPr>
+          </a:p>
+          <a:p>
+            <a:pPr marL="0" indent="0">
+              <a:buNone/>
+            </a:pPr>
+            <a:endParaRPr lang="pt-BR" sz="2400" dirty="0" smtClean="0"/>
           </a:p>
         </p:txBody>
       </p:sp>
@@ -6130,6 +6512,454 @@
                 <a:defRPr/>
               </a:pPr>
               <a:t>11</a:t>
+            </a:fld>
+            <a:endParaRPr lang="pt-BR"/>
+          </a:p>
+        </p:txBody>
+      </p:sp>
+    </p:spTree>
+  </p:cSld>
+  <p:clrMapOvr>
+    <a:masterClrMapping/>
+  </p:clrMapOvr>
+  <p:timing>
+    <p:tnLst>
+      <p:par>
+        <p:cTn id="1" dur="indefinite" restart="never" nodeType="tmRoot"/>
+      </p:par>
+    </p:tnLst>
+  </p:timing>
+</p:sld>
+</file>
+
+<file path=ppt/slides/slide12.xml><?xml version="1.0" encoding="utf-8"?>
+<p:sld xmlns:a="http://schemas.openxmlformats.org/drawingml/2006/main" xmlns:r="http://schemas.openxmlformats.org/officeDocument/2006/relationships" xmlns:p="http://schemas.openxmlformats.org/presentationml/2006/main">
+  <p:cSld>
+    <p:spTree>
+      <p:nvGrpSpPr>
+        <p:cNvPr id="1" name=""/>
+        <p:cNvGrpSpPr/>
+        <p:nvPr/>
+      </p:nvGrpSpPr>
+      <p:grpSpPr>
+        <a:xfrm>
+          <a:off x="0" y="0"/>
+          <a:ext cx="0" cy="0"/>
+          <a:chOff x="0" y="0"/>
+          <a:chExt cx="0" cy="0"/>
+        </a:xfrm>
+      </p:grpSpPr>
+      <p:sp>
+        <p:nvSpPr>
+          <p:cNvPr id="2" name="Título 1"/>
+          <p:cNvSpPr>
+            <a:spLocks noGrp="1"/>
+          </p:cNvSpPr>
+          <p:nvPr>
+            <p:ph type="title"/>
+          </p:nvPr>
+        </p:nvSpPr>
+        <p:spPr/>
+        <p:txBody>
+          <a:bodyPr/>
+          <a:lstStyle/>
+          <a:p>
+            <a:r>
+              <a:rPr lang="pt-BR" dirty="0" err="1" smtClean="0"/>
+              <a:t>Classpath</a:t>
+            </a:r>
+            <a:endParaRPr lang="pt-BR" dirty="0"/>
+          </a:p>
+        </p:txBody>
+      </p:sp>
+      <p:sp>
+        <p:nvSpPr>
+          <p:cNvPr id="3" name="Espaço Reservado para Conteúdo 2"/>
+          <p:cNvSpPr>
+            <a:spLocks noGrp="1"/>
+          </p:cNvSpPr>
+          <p:nvPr>
+            <p:ph idx="1"/>
+          </p:nvPr>
+        </p:nvSpPr>
+        <p:spPr/>
+        <p:txBody>
+          <a:bodyPr/>
+          <a:lstStyle/>
+          <a:p>
+            <a:pPr>
+              <a:spcBef>
+                <a:spcPts val="3000"/>
+              </a:spcBef>
+            </a:pPr>
+            <a:r>
+              <a:rPr lang="pt-BR" sz="2400" dirty="0" smtClean="0"/>
+              <a:t>O </a:t>
+            </a:r>
+            <a:r>
+              <a:rPr lang="pt-BR" sz="2400" dirty="0" err="1" smtClean="0"/>
+              <a:t>classpath</a:t>
+            </a:r>
+            <a:r>
+              <a:rPr lang="pt-BR" sz="2400" dirty="0" smtClean="0"/>
+              <a:t> é um conjunto de arquivos JAR e/ou diretórios contendo classes devidamente estruturadas em pacotes separados por “;” (Windows) ou “:” (Linux/Unix)</a:t>
+            </a:r>
+          </a:p>
+          <a:p>
+            <a:pPr>
+              <a:spcBef>
+                <a:spcPts val="3000"/>
+              </a:spcBef>
+            </a:pPr>
+            <a:r>
+              <a:rPr lang="pt-BR" sz="2400" dirty="0" smtClean="0"/>
+              <a:t>O </a:t>
+            </a:r>
+            <a:r>
+              <a:rPr lang="pt-BR" sz="2400" dirty="0" err="1" smtClean="0"/>
+              <a:t>class</a:t>
+            </a:r>
+            <a:r>
+              <a:rPr lang="pt-BR" sz="2400" dirty="0" err="1" smtClean="0"/>
+              <a:t>path</a:t>
+            </a:r>
+            <a:r>
+              <a:rPr lang="pt-BR" sz="2400" dirty="0" smtClean="0"/>
+              <a:t> p</a:t>
+            </a:r>
+            <a:r>
+              <a:rPr lang="pt-BR" sz="2400" dirty="0" smtClean="0"/>
+              <a:t>recisa </a:t>
+            </a:r>
+            <a:r>
+              <a:rPr lang="pt-BR" sz="2400" dirty="0" smtClean="0"/>
+              <a:t>ser especificado tanto </a:t>
+            </a:r>
+            <a:r>
+              <a:rPr lang="pt-BR" sz="2400" dirty="0" smtClean="0"/>
+              <a:t>ao compilar </a:t>
+            </a:r>
+            <a:r>
+              <a:rPr lang="pt-BR" sz="2400" dirty="0" smtClean="0"/>
+              <a:t>quanto </a:t>
+            </a:r>
+            <a:r>
+              <a:rPr lang="pt-BR" sz="2400" dirty="0" smtClean="0"/>
+              <a:t>ao executar suas </a:t>
+            </a:r>
+            <a:r>
+              <a:rPr lang="pt-BR" sz="2400" dirty="0" smtClean="0"/>
+              <a:t>classes</a:t>
+            </a:r>
+          </a:p>
+          <a:p>
+            <a:pPr>
+              <a:spcBef>
+                <a:spcPts val="3000"/>
+              </a:spcBef>
+            </a:pPr>
+            <a:r>
+              <a:rPr lang="pt-BR" sz="2400" dirty="0" smtClean="0"/>
+              <a:t>É possível criar um </a:t>
+            </a:r>
+            <a:r>
+              <a:rPr lang="pt-BR" sz="2400" dirty="0" err="1" smtClean="0"/>
+              <a:t>classpath</a:t>
+            </a:r>
+            <a:r>
+              <a:rPr lang="pt-BR" sz="2400" dirty="0" smtClean="0"/>
+              <a:t> padrão em seu sistema operacional com a variável de ambiente CLASSPATH</a:t>
+            </a:r>
+            <a:endParaRPr lang="pt-BR" sz="2400" dirty="0"/>
+          </a:p>
+        </p:txBody>
+      </p:sp>
+      <p:sp>
+        <p:nvSpPr>
+          <p:cNvPr id="4" name="Espaço Reservado para Número de Slide 3"/>
+          <p:cNvSpPr>
+            <a:spLocks noGrp="1"/>
+          </p:cNvSpPr>
+          <p:nvPr>
+            <p:ph type="sldNum" sz="quarter" idx="12"/>
+          </p:nvPr>
+        </p:nvSpPr>
+        <p:spPr/>
+        <p:txBody>
+          <a:bodyPr/>
+          <a:lstStyle/>
+          <a:p>
+            <a:pPr>
+              <a:defRPr/>
+            </a:pPr>
+            <a:fld id="{AEACC508-E2A8-4506-8DBC-E8C74C965D8E}" type="slidenum">
+              <a:rPr lang="pt-BR" smtClean="0"/>
+              <a:pPr>
+                <a:defRPr/>
+              </a:pPr>
+              <a:t>12</a:t>
+            </a:fld>
+            <a:endParaRPr lang="pt-BR"/>
+          </a:p>
+        </p:txBody>
+      </p:sp>
+    </p:spTree>
+  </p:cSld>
+  <p:clrMapOvr>
+    <a:masterClrMapping/>
+  </p:clrMapOvr>
+  <p:timing>
+    <p:tnLst>
+      <p:par>
+        <p:cTn id="1" dur="indefinite" restart="never" nodeType="tmRoot"/>
+      </p:par>
+    </p:tnLst>
+  </p:timing>
+</p:sld>
+</file>
+
+<file path=ppt/slides/slide13.xml><?xml version="1.0" encoding="utf-8"?>
+<p:sld xmlns:a="http://schemas.openxmlformats.org/drawingml/2006/main" xmlns:r="http://schemas.openxmlformats.org/officeDocument/2006/relationships" xmlns:p="http://schemas.openxmlformats.org/presentationml/2006/main">
+  <p:cSld>
+    <p:spTree>
+      <p:nvGrpSpPr>
+        <p:cNvPr id="1" name=""/>
+        <p:cNvGrpSpPr/>
+        <p:nvPr/>
+      </p:nvGrpSpPr>
+      <p:grpSpPr>
+        <a:xfrm>
+          <a:off x="0" y="0"/>
+          <a:ext cx="0" cy="0"/>
+          <a:chOff x="0" y="0"/>
+          <a:chExt cx="0" cy="0"/>
+        </a:xfrm>
+      </p:grpSpPr>
+      <p:sp>
+        <p:nvSpPr>
+          <p:cNvPr id="2" name="Título 1"/>
+          <p:cNvSpPr>
+            <a:spLocks noGrp="1"/>
+          </p:cNvSpPr>
+          <p:nvPr>
+            <p:ph type="title"/>
+          </p:nvPr>
+        </p:nvSpPr>
+        <p:spPr/>
+        <p:txBody>
+          <a:bodyPr/>
+          <a:lstStyle/>
+          <a:p>
+            <a:r>
+              <a:rPr lang="pt-BR" dirty="0" smtClean="0"/>
+              <a:t>Exercício</a:t>
+            </a:r>
+            <a:endParaRPr lang="pt-BR" dirty="0"/>
+          </a:p>
+        </p:txBody>
+      </p:sp>
+      <p:sp>
+        <p:nvSpPr>
+          <p:cNvPr id="3" name="Espaço Reservado para Conteúdo 2"/>
+          <p:cNvSpPr>
+            <a:spLocks noGrp="1"/>
+          </p:cNvSpPr>
+          <p:nvPr>
+            <p:ph idx="1"/>
+          </p:nvPr>
+        </p:nvSpPr>
+        <p:spPr>
+          <a:xfrm>
+            <a:off x="457200" y="1600200"/>
+            <a:ext cx="7859216" cy="4525963"/>
+          </a:xfrm>
+        </p:spPr>
+        <p:txBody>
+          <a:bodyPr/>
+          <a:lstStyle/>
+          <a:p>
+            <a:pPr>
+              <a:spcBef>
+                <a:spcPts val="3000"/>
+              </a:spcBef>
+            </a:pPr>
+            <a:r>
+              <a:rPr lang="pt-BR" sz="2400" dirty="0" smtClean="0"/>
+              <a:t>Crie um novo projeto no eclipse e adicione a biblioteca </a:t>
+            </a:r>
+            <a:r>
+              <a:rPr lang="pt-BR" sz="2400" dirty="0" err="1" smtClean="0">
+                <a:solidFill>
+                  <a:srgbClr val="FFC000"/>
+                </a:solidFill>
+              </a:rPr>
+              <a:t>impacta-utils</a:t>
+            </a:r>
+            <a:r>
+              <a:rPr lang="pt-BR" sz="2400" dirty="0" smtClean="0">
+                <a:solidFill>
+                  <a:srgbClr val="FFC000"/>
+                </a:solidFill>
+              </a:rPr>
+              <a:t>.</a:t>
+            </a:r>
+            <a:r>
+              <a:rPr lang="pt-BR" sz="2400" dirty="0" err="1" smtClean="0">
+                <a:solidFill>
+                  <a:srgbClr val="FFC000"/>
+                </a:solidFill>
+              </a:rPr>
+              <a:t>jar</a:t>
+            </a:r>
+            <a:r>
+              <a:rPr lang="pt-BR" sz="2400" dirty="0" smtClean="0"/>
+              <a:t> (fornecida pelo instrutor) ao </a:t>
+            </a:r>
+            <a:r>
+              <a:rPr lang="pt-BR" sz="2400" dirty="0" err="1" smtClean="0"/>
+              <a:t>classpath</a:t>
+            </a:r>
+            <a:r>
+              <a:rPr lang="pt-BR" sz="2400" dirty="0" smtClean="0"/>
+              <a:t> de seu projeto;</a:t>
+            </a:r>
+          </a:p>
+          <a:p>
+            <a:pPr>
+              <a:spcBef>
+                <a:spcPts val="3000"/>
+              </a:spcBef>
+            </a:pPr>
+            <a:r>
+              <a:rPr lang="pt-BR" sz="2400" dirty="0" smtClean="0"/>
+              <a:t>Crie uma classe contendo o método </a:t>
+            </a:r>
+            <a:r>
+              <a:rPr lang="pt-BR" sz="2400" dirty="0" err="1" smtClean="0"/>
+              <a:t>main</a:t>
+            </a:r>
+            <a:r>
+              <a:rPr lang="pt-BR" sz="2400" dirty="0" smtClean="0"/>
+              <a:t> e instancie a classe </a:t>
+            </a:r>
+            <a:r>
+              <a:rPr lang="pt-BR" sz="2400" dirty="0" smtClean="0">
+                <a:solidFill>
+                  <a:srgbClr val="FFC000"/>
+                </a:solidFill>
+              </a:rPr>
+              <a:t>br.com.impacta.</a:t>
+            </a:r>
+            <a:r>
+              <a:rPr lang="pt-BR" sz="2400" dirty="0" err="1" smtClean="0">
+                <a:solidFill>
+                  <a:srgbClr val="FFC000"/>
+                </a:solidFill>
+              </a:rPr>
+              <a:t>noticiario</a:t>
+            </a:r>
+            <a:r>
+              <a:rPr lang="pt-BR" sz="2400" dirty="0" smtClean="0">
+                <a:solidFill>
+                  <a:srgbClr val="FFC000"/>
+                </a:solidFill>
+              </a:rPr>
+              <a:t>.</a:t>
+            </a:r>
+            <a:r>
+              <a:rPr lang="pt-BR" sz="2400" dirty="0" err="1" smtClean="0">
+                <a:solidFill>
+                  <a:srgbClr val="FFC000"/>
+                </a:solidFill>
+              </a:rPr>
+              <a:t>Noticiario</a:t>
+            </a:r>
+            <a:r>
+              <a:rPr lang="pt-BR" sz="2400" dirty="0" smtClean="0"/>
+              <a:t> (contida na biblioteca </a:t>
+            </a:r>
+            <a:r>
+              <a:rPr lang="pt-BR" sz="2400" dirty="0" err="1" smtClean="0"/>
+              <a:t>impacta-utils</a:t>
+            </a:r>
+            <a:r>
+              <a:rPr lang="pt-BR" sz="2400" dirty="0" smtClean="0"/>
+              <a:t>);</a:t>
+            </a:r>
+          </a:p>
+          <a:p>
+            <a:pPr>
+              <a:spcBef>
+                <a:spcPts val="3000"/>
+              </a:spcBef>
+            </a:pPr>
+            <a:r>
+              <a:rPr lang="pt-BR" sz="2400" dirty="0" smtClean="0"/>
+              <a:t>Utilize o </a:t>
+            </a:r>
+            <a:r>
+              <a:rPr lang="pt-BR" sz="2400" dirty="0" err="1" smtClean="0"/>
+              <a:t>metodo</a:t>
+            </a:r>
+            <a:r>
+              <a:rPr lang="pt-BR" sz="2400" dirty="0" smtClean="0"/>
+              <a:t> </a:t>
+            </a:r>
+            <a:r>
+              <a:rPr lang="pt-BR" sz="2400" dirty="0" err="1" smtClean="0">
+                <a:solidFill>
+                  <a:srgbClr val="FFC000"/>
+                </a:solidFill>
+              </a:rPr>
+              <a:t>getNoticia</a:t>
+            </a:r>
+            <a:r>
+              <a:rPr lang="pt-BR" sz="2400" dirty="0" smtClean="0">
+                <a:solidFill>
+                  <a:srgbClr val="FFC000"/>
+                </a:solidFill>
+              </a:rPr>
+              <a:t>()</a:t>
+            </a:r>
+            <a:r>
+              <a:rPr lang="pt-BR" sz="2400" dirty="0" smtClean="0"/>
+              <a:t> da instância criada para obter uma noticia aleatória e imprima esta notícia na tela com o System.</a:t>
+            </a:r>
+            <a:r>
+              <a:rPr lang="pt-BR" sz="2400" dirty="0" err="1" smtClean="0"/>
+              <a:t>out.println</a:t>
+            </a:r>
+            <a:r>
+              <a:rPr lang="pt-BR" sz="2400" dirty="0" smtClean="0"/>
+              <a:t>()</a:t>
+            </a:r>
+          </a:p>
+        </p:txBody>
+      </p:sp>
+      <p:sp>
+        <p:nvSpPr>
+          <p:cNvPr id="4" name="Espaço Reservado para Número de Slide 3"/>
+          <p:cNvSpPr>
+            <a:spLocks noGrp="1"/>
+          </p:cNvSpPr>
+          <p:nvPr>
+            <p:ph type="sldNum" sz="quarter" idx="12"/>
+          </p:nvPr>
+        </p:nvSpPr>
+        <p:spPr/>
+        <p:txBody>
+          <a:bodyPr/>
+          <a:lstStyle/>
+          <a:p>
+            <a:pPr>
+              <a:defRPr/>
+            </a:pPr>
+            <a:fld id="{AEACC508-E2A8-4506-8DBC-E8C74C965D8E}" type="slidenum">
+              <a:rPr lang="pt-BR" smtClean="0"/>
+              <a:pPr>
+                <a:defRPr/>
+              </a:pPr>
+              <a:t>13</a:t>
             </a:fld>
             <a:endParaRPr lang="pt-BR"/>
           </a:p>
@@ -6675,7 +7505,7 @@
           <a:p>
             <a:r>
               <a:rPr lang="pt-BR" sz="2400" dirty="0" smtClean="0"/>
-              <a:t>O JDK possui uma ferramenta criada especificamente para gerar arquivos JAR:</a:t>
+              <a:t>Todavia, o JDK possui uma ferramenta própria criada especificamente para gerar arquivos JAR:</a:t>
             </a:r>
           </a:p>
           <a:p>
@@ -6724,11 +7554,6 @@
               </a:rPr>
               <a:t>  C:\dist\tabajara.jar  -C  C:\src  .</a:t>
             </a:r>
-            <a:endParaRPr lang="pt-BR" sz="2400" dirty="0" smtClean="0">
-              <a:solidFill>
-                <a:srgbClr val="FFC000"/>
-              </a:solidFill>
-            </a:endParaRPr>
           </a:p>
           <a:p>
             <a:endParaRPr lang="pt-BR" sz="2400" dirty="0" smtClean="0"/>
@@ -6936,11 +7761,7 @@
             <a:pPr algn="ctr"/>
             <a:r>
               <a:rPr lang="pt-BR" dirty="0" smtClean="0"/>
-              <a:t>de sua </a:t>
-            </a:r>
-            <a:r>
-              <a:rPr lang="pt-BR" dirty="0" smtClean="0"/>
-              <a:t>aplicação</a:t>
+              <a:t>de sua aplicação</a:t>
             </a:r>
           </a:p>
         </p:txBody>
@@ -7383,7 +8204,7 @@
         <p:spPr>
           <a:xfrm>
             <a:off x="457200" y="1600201"/>
-            <a:ext cx="4690864" cy="2404864"/>
+            <a:ext cx="4906888" cy="2404864"/>
           </a:xfrm>
         </p:spPr>
         <p:txBody>
@@ -7392,7 +8213,7 @@
           <a:p>
             <a:r>
               <a:rPr lang="pt-BR" sz="2400" dirty="0" smtClean="0"/>
-              <a:t>Embora não seja obrigatório, arquivos JAR em geral possuem um arquivo interno </a:t>
+              <a:t>Um JAR geralmente possui internamente um arquivo texto </a:t>
             </a:r>
             <a:r>
               <a:rPr lang="pt-BR" sz="2400" dirty="0" smtClean="0">
@@ -7412,7 +8233,7 @@
             </a:r>
             <a:r>
               <a:rPr lang="pt-BR" sz="2400" dirty="0" smtClean="0"/>
-              <a:t> chamado simplesmente de manifesto.</a:t>
+              <a:t> chamado de manifesto.</a:t>
             </a:r>
           </a:p>
         </p:txBody>
@@ -7514,13 +8335,8 @@
           <a:p>
             <a:r>
               <a:rPr lang="pt-BR" sz="2400" dirty="0" smtClean="0"/>
-              <a:t>O manifesto é um arquivo texto contendo </a:t>
-            </a:r>
-            <a:r>
-              <a:rPr lang="pt-BR" sz="2400" dirty="0" smtClean="0"/>
-              <a:t>informações adicionais sobre as classes empacotadas no JAR tais como versão da aplicação, autor e outros.</a:t>
-            </a:r>
-            <a:endParaRPr lang="pt-BR" sz="2400" dirty="0" smtClean="0"/>
+              <a:t>O manifesto é um arquivo texto contendo informações adicionais sobre as classes empacotadas no JAR tais como versão da aplicação, autor e outros.</a:t>
+            </a:r>
           </a:p>
           <a:p>
             <a:endParaRPr lang="pt-BR" sz="2400" dirty="0"/>
@@ -7595,7 +8411,7 @@
         <p:spPr>
           <a:xfrm>
             <a:off x="457200" y="1600200"/>
-            <a:ext cx="7499176" cy="2044823"/>
+            <a:ext cx="7499176" cy="2980928"/>
           </a:xfrm>
         </p:spPr>
         <p:txBody>
@@ -7734,11 +8550,7 @@
             </a:r>
             <a:r>
               <a:rPr lang="en-US" sz="2000" dirty="0" smtClean="0"/>
-              <a:t>1.6.0_22 (Sun Microsystems Inc</a:t>
-            </a:r>
-            <a:r>
-              <a:rPr lang="en-US" sz="2000" dirty="0" smtClean="0"/>
-              <a:t>.)</a:t>
+              <a:t>1.6.0_22 (Sun Microsystems Inc.)</a:t>
             </a:r>
             <a:endParaRPr lang="pt-BR" sz="2000" dirty="0" smtClean="0"/>
           </a:p>
@@ -7825,7 +8637,6 @@
               <a:rPr lang="pt-BR" dirty="0" smtClean="0"/>
               <a:t>O arquivo MANIFEST.MF</a:t>
             </a:r>
-            <a:endParaRPr lang="pt-BR" dirty="0" smtClean="0"/>
           </a:p>
         </p:txBody>
       </p:sp>
@@ -7850,7 +8661,7 @@
           <a:lstStyle/>
           <a:p>
             <a:r>
-              <a:rPr lang="pt-BR" sz="2400" dirty="0" smtClean="0"/>
+              <a:rPr lang="pt-BR" sz="2800" dirty="0" smtClean="0"/>
               <a:t>Para customizar o seu manifesto, utilize a sintaxe abaixo:</a:t>
             </a:r>
           </a:p>
@@ -7924,11 +8735,6 @@
               </a:rPr>
               <a:t>  C:\rascunho.txt  -C  C:\src  .</a:t>
             </a:r>
-            <a:endParaRPr lang="pt-BR" sz="2400" dirty="0" smtClean="0">
-              <a:solidFill>
-                <a:srgbClr val="FFC000"/>
-              </a:solidFill>
-            </a:endParaRPr>
           </a:p>
         </p:txBody>
       </p:sp>
@@ -8034,13 +8840,8 @@
             <a:pPr algn="ctr"/>
             <a:r>
               <a:rPr lang="pt-BR" dirty="0" smtClean="0"/>
-              <a:t>Arquivo contendo </a:t>
-            </a:r>
-            <a:r>
-              <a:rPr lang="pt-BR" dirty="0" smtClean="0"/>
-              <a:t>o texto a ser adicionado ao manifesto</a:t>
-            </a:r>
-            <a:endParaRPr lang="pt-BR" dirty="0" smtClean="0"/>
+              <a:t>Arquivo contendo o texto a ser adicionado ao manifesto</a:t>
+            </a:r>
           </a:p>
         </p:txBody>
       </p:sp>
@@ -8651,11 +9452,7 @@
               <a:pPr algn="ctr"/>
               <a:r>
                 <a:rPr lang="pt-BR" sz="1400" dirty="0" smtClean="0"/>
-                <a:t>class</a:t>
-              </a:r>
-              <a:r>
-                <a:rPr lang="pt-BR" sz="1400" dirty="0" smtClean="0"/>
-                <a:t>e que contem o método </a:t>
+                <a:t>classe que contem o método </a:t>
               </a:r>
               <a:r>
                 <a:rPr lang="pt-BR" sz="1400" dirty="0" err="1" smtClean="0"/>

</xml_diff>